<commit_message>
New organization of the paper, new version of section 3 and new section 4. Introduction and related works reviewed 06.04.2014
</commit_message>
<xml_diff>
--- a/CAISE2011/submitted/support/Fig-pews-expression-2.pptx
+++ b/CAISE2011/submitted/support/Fig-pews-expression-2.pptx
@@ -296,7 +296,7 @@
           <a:p>
             <a:fld id="{933020C1-D831-574E-B897-9FDBC80483AA}" type="datetimeFigureOut">
               <a:rPr lang="fr-FR" smtClean="0"/>
-              <a:t>03/12/11</a:t>
+              <a:t>06/03/2014</a:t>
             </a:fld>
             <a:endParaRPr lang="en-GB"/>
           </a:p>
@@ -466,7 +466,7 @@
           <a:p>
             <a:fld id="{933020C1-D831-574E-B897-9FDBC80483AA}" type="datetimeFigureOut">
               <a:rPr lang="fr-FR" smtClean="0"/>
-              <a:t>03/12/11</a:t>
+              <a:t>06/03/2014</a:t>
             </a:fld>
             <a:endParaRPr lang="en-GB"/>
           </a:p>
@@ -646,7 +646,7 @@
           <a:p>
             <a:fld id="{933020C1-D831-574E-B897-9FDBC80483AA}" type="datetimeFigureOut">
               <a:rPr lang="fr-FR" smtClean="0"/>
-              <a:t>03/12/11</a:t>
+              <a:t>06/03/2014</a:t>
             </a:fld>
             <a:endParaRPr lang="en-GB"/>
           </a:p>
@@ -816,7 +816,7 @@
           <a:p>
             <a:fld id="{933020C1-D831-574E-B897-9FDBC80483AA}" type="datetimeFigureOut">
               <a:rPr lang="fr-FR" smtClean="0"/>
-              <a:t>03/12/11</a:t>
+              <a:t>06/03/2014</a:t>
             </a:fld>
             <a:endParaRPr lang="en-GB"/>
           </a:p>
@@ -1062,7 +1062,7 @@
           <a:p>
             <a:fld id="{933020C1-D831-574E-B897-9FDBC80483AA}" type="datetimeFigureOut">
               <a:rPr lang="fr-FR" smtClean="0"/>
-              <a:t>03/12/11</a:t>
+              <a:t>06/03/2014</a:t>
             </a:fld>
             <a:endParaRPr lang="en-GB"/>
           </a:p>
@@ -1350,7 +1350,7 @@
           <a:p>
             <a:fld id="{933020C1-D831-574E-B897-9FDBC80483AA}" type="datetimeFigureOut">
               <a:rPr lang="fr-FR" smtClean="0"/>
-              <a:t>03/12/11</a:t>
+              <a:t>06/03/2014</a:t>
             </a:fld>
             <a:endParaRPr lang="en-GB"/>
           </a:p>
@@ -1772,7 +1772,7 @@
           <a:p>
             <a:fld id="{933020C1-D831-574E-B897-9FDBC80483AA}" type="datetimeFigureOut">
               <a:rPr lang="fr-FR" smtClean="0"/>
-              <a:t>03/12/11</a:t>
+              <a:t>06/03/2014</a:t>
             </a:fld>
             <a:endParaRPr lang="en-GB"/>
           </a:p>
@@ -1890,7 +1890,7 @@
           <a:p>
             <a:fld id="{933020C1-D831-574E-B897-9FDBC80483AA}" type="datetimeFigureOut">
               <a:rPr lang="fr-FR" smtClean="0"/>
-              <a:t>03/12/11</a:t>
+              <a:t>06/03/2014</a:t>
             </a:fld>
             <a:endParaRPr lang="en-GB"/>
           </a:p>
@@ -1985,7 +1985,7 @@
           <a:p>
             <a:fld id="{933020C1-D831-574E-B897-9FDBC80483AA}" type="datetimeFigureOut">
               <a:rPr lang="fr-FR" smtClean="0"/>
-              <a:t>03/12/11</a:t>
+              <a:t>06/03/2014</a:t>
             </a:fld>
             <a:endParaRPr lang="en-GB"/>
           </a:p>
@@ -2262,7 +2262,7 @@
           <a:p>
             <a:fld id="{933020C1-D831-574E-B897-9FDBC80483AA}" type="datetimeFigureOut">
               <a:rPr lang="fr-FR" smtClean="0"/>
-              <a:t>03/12/11</a:t>
+              <a:t>06/03/2014</a:t>
             </a:fld>
             <a:endParaRPr lang="en-GB"/>
           </a:p>
@@ -2515,7 +2515,7 @@
           <a:p>
             <a:fld id="{933020C1-D831-574E-B897-9FDBC80483AA}" type="datetimeFigureOut">
               <a:rPr lang="fr-FR" smtClean="0"/>
-              <a:t>03/12/11</a:t>
+              <a:t>06/03/2014</a:t>
             </a:fld>
             <a:endParaRPr lang="en-GB"/>
           </a:p>
@@ -2728,7 +2728,7 @@
           <a:p>
             <a:fld id="{933020C1-D831-574E-B897-9FDBC80483AA}" type="datetimeFigureOut">
               <a:rPr lang="fr-FR" smtClean="0"/>
-              <a:t>03/12/11</a:t>
+              <a:t>06/03/2014</a:t>
             </a:fld>
             <a:endParaRPr lang="en-GB"/>
           </a:p>
@@ -7639,12 +7639,12 @@
           <a:graphicData uri="http://schemas.openxmlformats.org/presentationml/2006/ole">
             <mc:AlternateContent xmlns:mc="http://schemas.openxmlformats.org/markup-compatibility/2006">
               <mc:Choice xmlns:v="urn:schemas-microsoft-com:vml" Requires="v">
-                <p:oleObj spid="_x0000_s2173" name="Document" r:id="rId4" imgW="9220200" imgH="5397500" progId="Word.Document.12">
+                <p:oleObj spid="_x0000_s2176" name="Document" r:id="rId3" imgW="9220200" imgH="5397500" progId="Word.Document.12">
                   <p:embed/>
                 </p:oleObj>
               </mc:Choice>
               <mc:Fallback>
-                <p:oleObj name="Document" r:id="rId4" imgW="9220200" imgH="5397500" progId="Word.Document.12">
+                <p:oleObj name="Document" r:id="rId3" imgW="9220200" imgH="5397500" progId="Word.Document.12">
                   <p:embed/>
                   <p:pic>
                     <p:nvPicPr>
@@ -7653,7 +7653,7 @@
                       <p:nvPr/>
                     </p:nvPicPr>
                     <p:blipFill>
-                      <a:blip r:embed="rId5"/>
+                      <a:blip r:embed="rId4"/>
                       <a:stretch>
                         <a:fillRect/>
                       </a:stretch>
@@ -7733,12 +7733,12 @@
           <a:graphicData uri="http://schemas.openxmlformats.org/presentationml/2006/ole">
             <mc:AlternateContent xmlns:mc="http://schemas.openxmlformats.org/markup-compatibility/2006">
               <mc:Choice xmlns:v="urn:schemas-microsoft-com:vml" Requires="v">
-                <p:oleObj spid="_x0000_s3186" name="Document" r:id="rId4" imgW="9398000" imgH="5295900" progId="Word.Document.12">
+                <p:oleObj spid="_x0000_s3189" name="Document" r:id="rId3" imgW="9398000" imgH="5295900" progId="Word.Document.12">
                   <p:embed/>
                 </p:oleObj>
               </mc:Choice>
               <mc:Fallback>
-                <p:oleObj name="Document" r:id="rId4" imgW="9398000" imgH="5295900" progId="Word.Document.12">
+                <p:oleObj name="Document" r:id="rId3" imgW="9398000" imgH="5295900" progId="Word.Document.12">
                   <p:embed/>
                   <p:pic>
                     <p:nvPicPr>
@@ -7747,7 +7747,7 @@
                       <p:nvPr/>
                     </p:nvPicPr>
                     <p:blipFill>
-                      <a:blip r:embed="rId5"/>
+                      <a:blip r:embed="rId4"/>
                       <a:stretch>
                         <a:fillRect/>
                       </a:stretch>
@@ -7827,12 +7827,12 @@
           <a:graphicData uri="http://schemas.openxmlformats.org/presentationml/2006/ole">
             <mc:AlternateContent xmlns:mc="http://schemas.openxmlformats.org/markup-compatibility/2006">
               <mc:Choice xmlns:v="urn:schemas-microsoft-com:vml" Requires="v">
-                <p:oleObj spid="_x0000_s4218" name="Document" r:id="rId4" imgW="9398000" imgH="5308600" progId="Word.Document.12">
+                <p:oleObj spid="_x0000_s4221" name="Document" r:id="rId3" imgW="9398000" imgH="5308600" progId="Word.Document.12">
                   <p:embed/>
                 </p:oleObj>
               </mc:Choice>
               <mc:Fallback>
-                <p:oleObj name="Document" r:id="rId4" imgW="9398000" imgH="5308600" progId="Word.Document.12">
+                <p:oleObj name="Document" r:id="rId3" imgW="9398000" imgH="5308600" progId="Word.Document.12">
                   <p:embed/>
                   <p:pic>
                     <p:nvPicPr>
@@ -7841,7 +7841,7 @@
                       <p:nvPr/>
                     </p:nvPicPr>
                     <p:blipFill>
-                      <a:blip r:embed="rId5"/>
+                      <a:blip r:embed="rId4"/>
                       <a:stretch>
                         <a:fillRect/>
                       </a:stretch>
@@ -10908,8 +10908,8 @@
             </p:nvSpPr>
             <p:spPr>
               <a:xfrm>
-                <a:off x="2419346" y="698500"/>
-                <a:ext cx="628861" cy="369332"/>
+                <a:off x="2343146" y="698500"/>
+                <a:ext cx="882686" cy="369332"/>
               </a:xfrm>
               <a:prstGeom prst="rect">
                 <a:avLst/>
@@ -10936,7 +10936,7 @@
                     <a:latin typeface="Consolas"/>
                     <a:cs typeface="Consolas"/>
                   </a:rPr>
-                  <a:t>GetSong</a:t>
+                  <a:t>ListenMusic</a:t>
                 </a:r>
                 <a:endParaRPr lang="en-GB" sz="900" dirty="0">
                   <a:latin typeface="Consolas"/>
@@ -11022,11 +11022,11 @@
               </a:p>
               <a:p>
                 <a:r>
-                  <a:rPr lang="en-GB" sz="900" dirty="0" err="1" smtClean="0">
+                  <a:rPr lang="en-GB" sz="900" dirty="0" smtClean="0">
                     <a:latin typeface="Consolas"/>
                     <a:cs typeface="Consolas"/>
                   </a:rPr>
-                  <a:t>PublishingOK</a:t>
+                  <a:t>Confirmation</a:t>
                 </a:r>
                 <a:endParaRPr lang="en-GB" sz="900" dirty="0">
                   <a:latin typeface="Consolas"/>
@@ -13408,12 +13408,12 @@
           <a:graphicData uri="http://schemas.openxmlformats.org/presentationml/2006/ole">
             <mc:AlternateContent xmlns:mc="http://schemas.openxmlformats.org/markup-compatibility/2006">
               <mc:Choice xmlns:v="urn:schemas-microsoft-com:vml" Requires="v">
-                <p:oleObj spid="_x0000_s1057" name="Document" r:id="rId4" imgW="8890000" imgH="4305300" progId="Word.Document.12">
+                <p:oleObj spid="_x0000_s1060" name="Document" r:id="rId3" imgW="8890000" imgH="4305300" progId="Word.Document.12">
                   <p:embed/>
                 </p:oleObj>
               </mc:Choice>
               <mc:Fallback>
-                <p:oleObj name="Document" r:id="rId4" imgW="8890000" imgH="4305300" progId="Word.Document.12">
+                <p:oleObj name="Document" r:id="rId3" imgW="8890000" imgH="4305300" progId="Word.Document.12">
                   <p:embed/>
                   <p:pic>
                     <p:nvPicPr>
@@ -13422,7 +13422,7 @@
                       <p:nvPr/>
                     </p:nvPicPr>
                     <p:blipFill>
-                      <a:blip r:embed="rId5"/>
+                      <a:blip r:embed="rId4"/>
                       <a:stretch>
                         <a:fillRect/>
                       </a:stretch>
@@ -13753,12 +13753,12 @@
             <a:graphicData uri="http://schemas.openxmlformats.org/presentationml/2006/ole">
               <mc:AlternateContent xmlns:mc="http://schemas.openxmlformats.org/markup-compatibility/2006">
                 <mc:Choice xmlns:v="urn:schemas-microsoft-com:vml" Requires="v">
-                  <p:oleObj spid="_x0000_s5157" name="Document" r:id="rId4" imgW="9220200" imgH="5397500" progId="Word.Document.12">
+                  <p:oleObj spid="_x0000_s5164" name="Document" r:id="rId3" imgW="9220200" imgH="5397500" progId="Word.Document.12">
                     <p:embed/>
                   </p:oleObj>
                 </mc:Choice>
                 <mc:Fallback>
-                  <p:oleObj name="Document" r:id="rId4" imgW="9220200" imgH="5397500" progId="Word.Document.12">
+                  <p:oleObj name="Document" r:id="rId3" imgW="9220200" imgH="5397500" progId="Word.Document.12">
                     <p:embed/>
                     <p:pic>
                       <p:nvPicPr>
@@ -13767,7 +13767,7 @@
                         <p:nvPr/>
                       </p:nvPicPr>
                       <p:blipFill>
-                        <a:blip r:embed="rId5"/>
+                        <a:blip r:embed="rId4"/>
                         <a:stretch>
                           <a:fillRect/>
                         </a:stretch>
@@ -13810,12 +13810,12 @@
             <a:graphicData uri="http://schemas.openxmlformats.org/presentationml/2006/ole">
               <mc:AlternateContent xmlns:mc="http://schemas.openxmlformats.org/markup-compatibility/2006">
                 <mc:Choice xmlns:v="urn:schemas-microsoft-com:vml" Requires="v">
-                  <p:oleObj spid="_x0000_s5158" name="Document" r:id="rId7" imgW="9398000" imgH="5295900" progId="Word.Document.12">
+                  <p:oleObj spid="_x0000_s5165" name="Document" r:id="rId5" imgW="9398000" imgH="5295900" progId="Word.Document.12">
                     <p:embed/>
                   </p:oleObj>
                 </mc:Choice>
                 <mc:Fallback>
-                  <p:oleObj name="Document" r:id="rId7" imgW="9398000" imgH="5295900" progId="Word.Document.12">
+                  <p:oleObj name="Document" r:id="rId5" imgW="9398000" imgH="5295900" progId="Word.Document.12">
                     <p:embed/>
                     <p:pic>
                       <p:nvPicPr>
@@ -13824,7 +13824,7 @@
                         <p:nvPr/>
                       </p:nvPicPr>
                       <p:blipFill>
-                        <a:blip r:embed="rId8"/>
+                        <a:blip r:embed="rId6"/>
                         <a:stretch>
                           <a:fillRect/>
                         </a:stretch>
@@ -13867,12 +13867,12 @@
             <a:graphicData uri="http://schemas.openxmlformats.org/presentationml/2006/ole">
               <mc:AlternateContent xmlns:mc="http://schemas.openxmlformats.org/markup-compatibility/2006">
                 <mc:Choice xmlns:v="urn:schemas-microsoft-com:vml" Requires="v">
-                  <p:oleObj spid="_x0000_s5159" name="Document" r:id="rId10" imgW="9398000" imgH="5308600" progId="Word.Document.12">
+                  <p:oleObj spid="_x0000_s5166" name="Document" r:id="rId7" imgW="9398000" imgH="5308600" progId="Word.Document.12">
                     <p:embed/>
                   </p:oleObj>
                 </mc:Choice>
                 <mc:Fallback>
-                  <p:oleObj name="Document" r:id="rId10" imgW="9398000" imgH="5308600" progId="Word.Document.12">
+                  <p:oleObj name="Document" r:id="rId7" imgW="9398000" imgH="5308600" progId="Word.Document.12">
                     <p:embed/>
                     <p:pic>
                       <p:nvPicPr>
@@ -13881,7 +13881,7 @@
                         <p:nvPr/>
                       </p:nvPicPr>
                       <p:blipFill>
-                        <a:blip r:embed="rId11"/>
+                        <a:blip r:embed="rId8"/>
                         <a:stretch>
                           <a:fillRect/>
                         </a:stretch>

</xml_diff>